<commit_message>
ppts scripts are added.
</commit_message>
<xml_diff>
--- a/ppt/java/interview-questions/spring interview/3-BeanFactoryandApplicationContext/BeanFactoryandApplicationContext.pptx
+++ b/ppt/java/interview-questions/spring interview/3-BeanFactoryandApplicationContext/BeanFactoryandApplicationContext.pptx
@@ -4,6 +4,9 @@
   <p:sldMasterIdLst>
     <p:sldMasterId id="2147483660" r:id="rId1"/>
   </p:sldMasterIdLst>
+  <p:notesMasterIdLst>
+    <p:notesMasterId r:id="rId13"/>
+  </p:notesMasterIdLst>
   <p:sldIdLst>
     <p:sldId id="256" r:id="rId2"/>
     <p:sldId id="257" r:id="rId3"/>
@@ -131,6 +134,1783 @@
     </p:ext>
   </p:extLst>
 </p:presentation>
+</file>
+
+<file path=ppt/notesMasters/notesMaster1.xml><?xml version="1.0" encoding="utf-8"?>
+<p:notesMaster xmlns:a="http://schemas.openxmlformats.org/drawingml/2006/main" xmlns:r="http://schemas.openxmlformats.org/officeDocument/2006/relationships" xmlns:p="http://schemas.openxmlformats.org/presentationml/2006/main">
+  <p:cSld>
+    <p:bg>
+      <p:bgRef idx="1001">
+        <a:schemeClr val="bg1"/>
+      </p:bgRef>
+    </p:bg>
+    <p:spTree>
+      <p:nvGrpSpPr>
+        <p:cNvPr id="1" name=""/>
+        <p:cNvGrpSpPr/>
+        <p:nvPr/>
+      </p:nvGrpSpPr>
+      <p:grpSpPr>
+        <a:xfrm>
+          <a:off x="0" y="0"/>
+          <a:ext cx="0" cy="0"/>
+          <a:chOff x="0" y="0"/>
+          <a:chExt cx="0" cy="0"/>
+        </a:xfrm>
+      </p:grpSpPr>
+      <p:sp>
+        <p:nvSpPr>
+          <p:cNvPr id="2" name="Header Placeholder 1"/>
+          <p:cNvSpPr>
+            <a:spLocks noGrp="1"/>
+          </p:cNvSpPr>
+          <p:nvPr>
+            <p:ph type="hdr" sz="quarter"/>
+          </p:nvPr>
+        </p:nvSpPr>
+        <p:spPr>
+          <a:xfrm>
+            <a:off x="0" y="0"/>
+            <a:ext cx="2971800" cy="458788"/>
+          </a:xfrm>
+          <a:prstGeom prst="rect">
+            <a:avLst/>
+          </a:prstGeom>
+        </p:spPr>
+        <p:txBody>
+          <a:bodyPr vert="horz" lIns="91440" tIns="45720" rIns="91440" bIns="45720" rtlCol="0"/>
+          <a:lstStyle>
+            <a:lvl1pPr algn="l">
+              <a:defRPr sz="1200"/>
+            </a:lvl1pPr>
+          </a:lstStyle>
+          <a:p>
+            <a:endParaRPr lang="en-US"/>
+          </a:p>
+        </p:txBody>
+      </p:sp>
+      <p:sp>
+        <p:nvSpPr>
+          <p:cNvPr id="3" name="Date Placeholder 2"/>
+          <p:cNvSpPr>
+            <a:spLocks noGrp="1"/>
+          </p:cNvSpPr>
+          <p:nvPr>
+            <p:ph type="dt" idx="1"/>
+          </p:nvPr>
+        </p:nvSpPr>
+        <p:spPr>
+          <a:xfrm>
+            <a:off x="3884613" y="0"/>
+            <a:ext cx="2971800" cy="458788"/>
+          </a:xfrm>
+          <a:prstGeom prst="rect">
+            <a:avLst/>
+          </a:prstGeom>
+        </p:spPr>
+        <p:txBody>
+          <a:bodyPr vert="horz" lIns="91440" tIns="45720" rIns="91440" bIns="45720" rtlCol="0"/>
+          <a:lstStyle>
+            <a:lvl1pPr algn="r">
+              <a:defRPr sz="1200"/>
+            </a:lvl1pPr>
+          </a:lstStyle>
+          <a:p>
+            <a:fld id="{B4A0BBCE-0DE7-4BE6-9881-737EE67B2F19}" type="datetimeFigureOut">
+              <a:rPr lang="en-US" smtClean="0"/>
+              <a:t>4/3/2025</a:t>
+            </a:fld>
+            <a:endParaRPr lang="en-US"/>
+          </a:p>
+        </p:txBody>
+      </p:sp>
+      <p:sp>
+        <p:nvSpPr>
+          <p:cNvPr id="4" name="Slide Image Placeholder 3"/>
+          <p:cNvSpPr>
+            <a:spLocks noGrp="1" noRot="1" noChangeAspect="1"/>
+          </p:cNvSpPr>
+          <p:nvPr>
+            <p:ph type="sldImg" idx="2"/>
+          </p:nvPr>
+        </p:nvSpPr>
+        <p:spPr>
+          <a:xfrm>
+            <a:off x="1371600" y="1143000"/>
+            <a:ext cx="4114800" cy="3086100"/>
+          </a:xfrm>
+          <a:prstGeom prst="rect">
+            <a:avLst/>
+          </a:prstGeom>
+          <a:noFill/>
+          <a:ln w="12700">
+            <a:solidFill>
+              <a:prstClr val="black"/>
+            </a:solidFill>
+          </a:ln>
+        </p:spPr>
+        <p:txBody>
+          <a:bodyPr vert="horz" lIns="91440" tIns="45720" rIns="91440" bIns="45720" rtlCol="0" anchor="ctr"/>
+          <a:lstStyle/>
+          <a:p>
+            <a:endParaRPr lang="en-US"/>
+          </a:p>
+        </p:txBody>
+      </p:sp>
+      <p:sp>
+        <p:nvSpPr>
+          <p:cNvPr id="5" name="Notes Placeholder 4"/>
+          <p:cNvSpPr>
+            <a:spLocks noGrp="1"/>
+          </p:cNvSpPr>
+          <p:nvPr>
+            <p:ph type="body" sz="quarter" idx="3"/>
+          </p:nvPr>
+        </p:nvSpPr>
+        <p:spPr>
+          <a:xfrm>
+            <a:off x="685800" y="4400550"/>
+            <a:ext cx="5486400" cy="3600450"/>
+          </a:xfrm>
+          <a:prstGeom prst="rect">
+            <a:avLst/>
+          </a:prstGeom>
+        </p:spPr>
+        <p:txBody>
+          <a:bodyPr vert="horz" lIns="91440" tIns="45720" rIns="91440" bIns="45720" rtlCol="0"/>
+          <a:lstStyle/>
+          <a:p>
+            <a:pPr lvl="0"/>
+            <a:r>
+              <a:rPr lang="en-US"/>
+              <a:t>Click to edit Master text styles</a:t>
+            </a:r>
+          </a:p>
+          <a:p>
+            <a:pPr lvl="1"/>
+            <a:r>
+              <a:rPr lang="en-US"/>
+              <a:t>Second level</a:t>
+            </a:r>
+          </a:p>
+          <a:p>
+            <a:pPr lvl="2"/>
+            <a:r>
+              <a:rPr lang="en-US"/>
+              <a:t>Third level</a:t>
+            </a:r>
+          </a:p>
+          <a:p>
+            <a:pPr lvl="3"/>
+            <a:r>
+              <a:rPr lang="en-US"/>
+              <a:t>Fourth level</a:t>
+            </a:r>
+          </a:p>
+          <a:p>
+            <a:pPr lvl="4"/>
+            <a:r>
+              <a:rPr lang="en-US"/>
+              <a:t>Fifth level</a:t>
+            </a:r>
+          </a:p>
+        </p:txBody>
+      </p:sp>
+      <p:sp>
+        <p:nvSpPr>
+          <p:cNvPr id="6" name="Footer Placeholder 5"/>
+          <p:cNvSpPr>
+            <a:spLocks noGrp="1"/>
+          </p:cNvSpPr>
+          <p:nvPr>
+            <p:ph type="ftr" sz="quarter" idx="4"/>
+          </p:nvPr>
+        </p:nvSpPr>
+        <p:spPr>
+          <a:xfrm>
+            <a:off x="0" y="8685213"/>
+            <a:ext cx="2971800" cy="458787"/>
+          </a:xfrm>
+          <a:prstGeom prst="rect">
+            <a:avLst/>
+          </a:prstGeom>
+        </p:spPr>
+        <p:txBody>
+          <a:bodyPr vert="horz" lIns="91440" tIns="45720" rIns="91440" bIns="45720" rtlCol="0" anchor="b"/>
+          <a:lstStyle>
+            <a:lvl1pPr algn="l">
+              <a:defRPr sz="1200"/>
+            </a:lvl1pPr>
+          </a:lstStyle>
+          <a:p>
+            <a:endParaRPr lang="en-US"/>
+          </a:p>
+        </p:txBody>
+      </p:sp>
+      <p:sp>
+        <p:nvSpPr>
+          <p:cNvPr id="7" name="Slide Number Placeholder 6"/>
+          <p:cNvSpPr>
+            <a:spLocks noGrp="1"/>
+          </p:cNvSpPr>
+          <p:nvPr>
+            <p:ph type="sldNum" sz="quarter" idx="5"/>
+          </p:nvPr>
+        </p:nvSpPr>
+        <p:spPr>
+          <a:xfrm>
+            <a:off x="3884613" y="8685213"/>
+            <a:ext cx="2971800" cy="458787"/>
+          </a:xfrm>
+          <a:prstGeom prst="rect">
+            <a:avLst/>
+          </a:prstGeom>
+        </p:spPr>
+        <p:txBody>
+          <a:bodyPr vert="horz" lIns="91440" tIns="45720" rIns="91440" bIns="45720" rtlCol="0" anchor="b"/>
+          <a:lstStyle>
+            <a:lvl1pPr algn="r">
+              <a:defRPr sz="1200"/>
+            </a:lvl1pPr>
+          </a:lstStyle>
+          <a:p>
+            <a:fld id="{C44636D5-5DF6-479B-9D65-40E69E819BF9}" type="slidenum">
+              <a:rPr lang="en-US" smtClean="0"/>
+              <a:t>‹#›</a:t>
+            </a:fld>
+            <a:endParaRPr lang="en-US"/>
+          </a:p>
+        </p:txBody>
+      </p:sp>
+    </p:spTree>
+    <p:extLst>
+      <p:ext uri="{BB962C8B-B14F-4D97-AF65-F5344CB8AC3E}">
+        <p14:creationId xmlns:p14="http://schemas.microsoft.com/office/powerpoint/2010/main" val="712565771"/>
+      </p:ext>
+    </p:extLst>
+  </p:cSld>
+  <p:clrMap bg1="lt1" tx1="dk1" bg2="lt2" tx2="dk2" accent1="accent1" accent2="accent2" accent3="accent3" accent4="accent4" accent5="accent5" accent6="accent6" hlink="hlink" folHlink="folHlink"/>
+  <p:notesStyle>
+    <a:lvl1pPr marL="0" algn="l" defTabSz="914400" rtl="0" eaLnBrk="1" latinLnBrk="0" hangingPunct="1">
+      <a:defRPr sz="1200" kern="1200">
+        <a:solidFill>
+          <a:schemeClr val="tx1"/>
+        </a:solidFill>
+        <a:latin typeface="+mn-lt"/>
+        <a:ea typeface="+mn-ea"/>
+        <a:cs typeface="+mn-cs"/>
+      </a:defRPr>
+    </a:lvl1pPr>
+    <a:lvl2pPr marL="457200" algn="l" defTabSz="914400" rtl="0" eaLnBrk="1" latinLnBrk="0" hangingPunct="1">
+      <a:defRPr sz="1200" kern="1200">
+        <a:solidFill>
+          <a:schemeClr val="tx1"/>
+        </a:solidFill>
+        <a:latin typeface="+mn-lt"/>
+        <a:ea typeface="+mn-ea"/>
+        <a:cs typeface="+mn-cs"/>
+      </a:defRPr>
+    </a:lvl2pPr>
+    <a:lvl3pPr marL="914400" algn="l" defTabSz="914400" rtl="0" eaLnBrk="1" latinLnBrk="0" hangingPunct="1">
+      <a:defRPr sz="1200" kern="1200">
+        <a:solidFill>
+          <a:schemeClr val="tx1"/>
+        </a:solidFill>
+        <a:latin typeface="+mn-lt"/>
+        <a:ea typeface="+mn-ea"/>
+        <a:cs typeface="+mn-cs"/>
+      </a:defRPr>
+    </a:lvl3pPr>
+    <a:lvl4pPr marL="1371600" algn="l" defTabSz="914400" rtl="0" eaLnBrk="1" latinLnBrk="0" hangingPunct="1">
+      <a:defRPr sz="1200" kern="1200">
+        <a:solidFill>
+          <a:schemeClr val="tx1"/>
+        </a:solidFill>
+        <a:latin typeface="+mn-lt"/>
+        <a:ea typeface="+mn-ea"/>
+        <a:cs typeface="+mn-cs"/>
+      </a:defRPr>
+    </a:lvl4pPr>
+    <a:lvl5pPr marL="1828800" algn="l" defTabSz="914400" rtl="0" eaLnBrk="1" latinLnBrk="0" hangingPunct="1">
+      <a:defRPr sz="1200" kern="1200">
+        <a:solidFill>
+          <a:schemeClr val="tx1"/>
+        </a:solidFill>
+        <a:latin typeface="+mn-lt"/>
+        <a:ea typeface="+mn-ea"/>
+        <a:cs typeface="+mn-cs"/>
+      </a:defRPr>
+    </a:lvl5pPr>
+    <a:lvl6pPr marL="2286000" algn="l" defTabSz="914400" rtl="0" eaLnBrk="1" latinLnBrk="0" hangingPunct="1">
+      <a:defRPr sz="1200" kern="1200">
+        <a:solidFill>
+          <a:schemeClr val="tx1"/>
+        </a:solidFill>
+        <a:latin typeface="+mn-lt"/>
+        <a:ea typeface="+mn-ea"/>
+        <a:cs typeface="+mn-cs"/>
+      </a:defRPr>
+    </a:lvl6pPr>
+    <a:lvl7pPr marL="2743200" algn="l" defTabSz="914400" rtl="0" eaLnBrk="1" latinLnBrk="0" hangingPunct="1">
+      <a:defRPr sz="1200" kern="1200">
+        <a:solidFill>
+          <a:schemeClr val="tx1"/>
+        </a:solidFill>
+        <a:latin typeface="+mn-lt"/>
+        <a:ea typeface="+mn-ea"/>
+        <a:cs typeface="+mn-cs"/>
+      </a:defRPr>
+    </a:lvl7pPr>
+    <a:lvl8pPr marL="3200400" algn="l" defTabSz="914400" rtl="0" eaLnBrk="1" latinLnBrk="0" hangingPunct="1">
+      <a:defRPr sz="1200" kern="1200">
+        <a:solidFill>
+          <a:schemeClr val="tx1"/>
+        </a:solidFill>
+        <a:latin typeface="+mn-lt"/>
+        <a:ea typeface="+mn-ea"/>
+        <a:cs typeface="+mn-cs"/>
+      </a:defRPr>
+    </a:lvl8pPr>
+    <a:lvl9pPr marL="3657600" algn="l" defTabSz="914400" rtl="0" eaLnBrk="1" latinLnBrk="0" hangingPunct="1">
+      <a:defRPr sz="1200" kern="1200">
+        <a:solidFill>
+          <a:schemeClr val="tx1"/>
+        </a:solidFill>
+        <a:latin typeface="+mn-lt"/>
+        <a:ea typeface="+mn-ea"/>
+        <a:cs typeface="+mn-cs"/>
+      </a:defRPr>
+    </a:lvl9pPr>
+  </p:notesStyle>
+</p:notesMaster>
+</file>
+
+<file path=ppt/notesSlides/notesSlide1.xml><?xml version="1.0" encoding="utf-8"?>
+<p:notes xmlns:a="http://schemas.openxmlformats.org/drawingml/2006/main" xmlns:r="http://schemas.openxmlformats.org/officeDocument/2006/relationships" xmlns:p="http://schemas.openxmlformats.org/presentationml/2006/main">
+  <p:cSld>
+    <p:spTree>
+      <p:nvGrpSpPr>
+        <p:cNvPr id="1" name=""/>
+        <p:cNvGrpSpPr/>
+        <p:nvPr/>
+      </p:nvGrpSpPr>
+      <p:grpSpPr>
+        <a:xfrm>
+          <a:off x="0" y="0"/>
+          <a:ext cx="0" cy="0"/>
+          <a:chOff x="0" y="0"/>
+          <a:chExt cx="0" cy="0"/>
+        </a:xfrm>
+      </p:grpSpPr>
+      <p:sp>
+        <p:nvSpPr>
+          <p:cNvPr id="2" name="Slide Image Placeholder 1"/>
+          <p:cNvSpPr>
+            <a:spLocks noGrp="1" noRot="1" noChangeAspect="1"/>
+          </p:cNvSpPr>
+          <p:nvPr>
+            <p:ph type="sldImg"/>
+          </p:nvPr>
+        </p:nvSpPr>
+        <p:spPr/>
+      </p:sp>
+      <p:sp>
+        <p:nvSpPr>
+          <p:cNvPr id="3" name="Notes Placeholder 2"/>
+          <p:cNvSpPr>
+            <a:spLocks noGrp="1"/>
+          </p:cNvSpPr>
+          <p:nvPr>
+            <p:ph type="body" idx="1"/>
+          </p:nvPr>
+        </p:nvSpPr>
+        <p:spPr/>
+        <p:txBody>
+          <a:bodyPr/>
+          <a:lstStyle/>
+          <a:p>
+            <a:pPr>
+              <a:buNone/>
+            </a:pPr>
+            <a:r>
+              <a:rPr lang="en-US" dirty="0"/>
+              <a:t>Alright, let’s dive straight into it! </a:t>
+            </a:r>
+            <a:r>
+              <a:rPr lang="en-US" b="1" dirty="0"/>
+              <a:t>Spring has two main containers to manage beans</a:t>
+            </a:r>
+            <a:r>
+              <a:rPr lang="en-US" dirty="0"/>
+              <a:t>—</a:t>
+            </a:r>
+            <a:r>
+              <a:rPr lang="en-US" b="1" dirty="0" err="1"/>
+              <a:t>BeanFactory</a:t>
+            </a:r>
+            <a:r>
+              <a:rPr lang="en-US" dirty="0"/>
+              <a:t> and </a:t>
+            </a:r>
+            <a:r>
+              <a:rPr lang="en-US" b="1" dirty="0" err="1"/>
+              <a:t>ApplicationContext</a:t>
+            </a:r>
+            <a:r>
+              <a:rPr lang="en-US" dirty="0"/>
+              <a:t>. But what exactly are they, and when should you use one over the other? Let’s break it down!</a:t>
+            </a:r>
+          </a:p>
+          <a:p>
+            <a:pPr>
+              <a:buNone/>
+            </a:pPr>
+            <a:r>
+              <a:rPr lang="en-US" b="1" dirty="0"/>
+              <a:t>What is a Spring Container?</a:t>
+            </a:r>
+          </a:p>
+          <a:p>
+            <a:pPr>
+              <a:buNone/>
+            </a:pPr>
+            <a:r>
+              <a:rPr lang="en-US" dirty="0"/>
+              <a:t>In </a:t>
+            </a:r>
+            <a:r>
+              <a:rPr lang="en-US" b="1" dirty="0"/>
+              <a:t>Spring</a:t>
+            </a:r>
+            <a:r>
+              <a:rPr lang="en-US" dirty="0"/>
+              <a:t>, a </a:t>
+            </a:r>
+            <a:r>
+              <a:rPr lang="en-US" b="1" dirty="0"/>
+              <a:t>container</a:t>
+            </a:r>
+            <a:r>
+              <a:rPr lang="en-US" dirty="0"/>
+              <a:t> is responsible for </a:t>
+            </a:r>
+            <a:r>
+              <a:rPr lang="en-US" b="1" dirty="0"/>
+              <a:t>managing the lifecycle of beans</a:t>
+            </a:r>
+            <a:r>
+              <a:rPr lang="en-US" dirty="0"/>
+              <a:t>—which means it </a:t>
+            </a:r>
+            <a:r>
+              <a:rPr lang="en-US" b="1" dirty="0"/>
+              <a:t>creates, configures, and manages Java objects</a:t>
+            </a:r>
+            <a:r>
+              <a:rPr lang="en-US" dirty="0"/>
+              <a:t>.</a:t>
+            </a:r>
+          </a:p>
+          <a:p>
+            <a:pPr>
+              <a:buNone/>
+            </a:pPr>
+            <a:r>
+              <a:rPr lang="en-US" dirty="0"/>
+              <a:t>Spring provides two main types of containers:</a:t>
+            </a:r>
+          </a:p>
+          <a:p>
+            <a:pPr>
+              <a:buFont typeface="+mj-lt"/>
+              <a:buAutoNum type="arabicPeriod"/>
+            </a:pPr>
+            <a:r>
+              <a:rPr lang="en-US" b="1" dirty="0" err="1"/>
+              <a:t>BeanFactory</a:t>
+            </a:r>
+            <a:r>
+              <a:rPr lang="en-US" dirty="0"/>
+              <a:t> – A </a:t>
+            </a:r>
+            <a:r>
+              <a:rPr lang="en-US" b="1" dirty="0"/>
+              <a:t>lightweight container</a:t>
+            </a:r>
+            <a:r>
+              <a:rPr lang="en-US" dirty="0"/>
+              <a:t> with basic features.</a:t>
+            </a:r>
+          </a:p>
+          <a:p>
+            <a:pPr>
+              <a:buFont typeface="+mj-lt"/>
+              <a:buAutoNum type="arabicPeriod"/>
+            </a:pPr>
+            <a:r>
+              <a:rPr lang="en-US" b="1" dirty="0" err="1"/>
+              <a:t>ApplicationContext</a:t>
+            </a:r>
+            <a:r>
+              <a:rPr lang="en-US" dirty="0"/>
+              <a:t> – A </a:t>
+            </a:r>
+            <a:r>
+              <a:rPr lang="en-US" b="1" dirty="0"/>
+              <a:t>more advanced</a:t>
+            </a:r>
+            <a:r>
+              <a:rPr lang="en-US" dirty="0"/>
+              <a:t> container with extra functionalities.</a:t>
+            </a:r>
+          </a:p>
+          <a:p>
+            <a:pPr>
+              <a:buNone/>
+            </a:pPr>
+            <a:r>
+              <a:rPr lang="en-US" dirty="0"/>
+              <a:t>Both do the </a:t>
+            </a:r>
+            <a:r>
+              <a:rPr lang="en-US" b="1" dirty="0"/>
+              <a:t>same basic job</a:t>
+            </a:r>
+            <a:r>
+              <a:rPr lang="en-US" dirty="0"/>
+              <a:t>—managing beans—but the way they work is quite different!</a:t>
+            </a:r>
+          </a:p>
+          <a:p>
+            <a:pPr>
+              <a:buNone/>
+            </a:pPr>
+            <a:r>
+              <a:rPr lang="en-US" b="1" dirty="0" err="1"/>
+              <a:t>BeanFactory</a:t>
+            </a:r>
+            <a:r>
+              <a:rPr lang="en-US" b="1" dirty="0"/>
+              <a:t> – The Basic Container</a:t>
+            </a:r>
+          </a:p>
+          <a:p>
+            <a:pPr>
+              <a:buNone/>
+            </a:pPr>
+            <a:r>
+              <a:rPr lang="en-US" dirty="0" err="1"/>
+              <a:t>BeanFactory</a:t>
+            </a:r>
+            <a:r>
+              <a:rPr lang="en-US" dirty="0"/>
+              <a:t> is the </a:t>
+            </a:r>
+            <a:r>
+              <a:rPr lang="en-US" b="1" dirty="0"/>
+              <a:t>simpler and more lightweight</a:t>
+            </a:r>
+            <a:r>
+              <a:rPr lang="en-US" dirty="0"/>
+              <a:t> option. Think of it as the </a:t>
+            </a:r>
+            <a:r>
+              <a:rPr lang="en-US" b="1" dirty="0"/>
+              <a:t>on-demand bean creator</a:t>
+            </a:r>
+            <a:r>
+              <a:rPr lang="en-US" dirty="0"/>
+              <a:t>—it only initializes beans </a:t>
+            </a:r>
+            <a:r>
+              <a:rPr lang="en-US" b="1" dirty="0"/>
+              <a:t>when you actually need them</a:t>
+            </a:r>
+            <a:r>
+              <a:rPr lang="en-US" dirty="0"/>
+              <a:t>.</a:t>
+            </a:r>
+          </a:p>
+          <a:p>
+            <a:pPr>
+              <a:buNone/>
+            </a:pPr>
+            <a:r>
+              <a:rPr lang="en-US" dirty="0"/>
+              <a:t>🔹 This is called </a:t>
+            </a:r>
+            <a:r>
+              <a:rPr lang="en-US" b="1" dirty="0"/>
+              <a:t>lazy initialization</a:t>
+            </a:r>
+            <a:r>
+              <a:rPr lang="en-US" dirty="0"/>
+              <a:t>, which means beans are </a:t>
+            </a:r>
+            <a:r>
+              <a:rPr lang="en-US" b="1" dirty="0"/>
+              <a:t>not created at startup</a:t>
+            </a:r>
+            <a:r>
+              <a:rPr lang="en-US" dirty="0"/>
+              <a:t> but only when they are first accessed. This can be useful in applications where memory efficiency is a priority.</a:t>
+            </a:r>
+          </a:p>
+          <a:p>
+            <a:pPr>
+              <a:buNone/>
+            </a:pPr>
+            <a:r>
+              <a:rPr lang="en-US" dirty="0"/>
+              <a:t>🔹 Since it’s lightweight, </a:t>
+            </a:r>
+            <a:r>
+              <a:rPr lang="en-US" b="1" dirty="0" err="1"/>
+              <a:t>BeanFactory</a:t>
+            </a:r>
+            <a:r>
+              <a:rPr lang="en-US" b="1" dirty="0"/>
+              <a:t> is best suited for small applications</a:t>
+            </a:r>
+            <a:r>
+              <a:rPr lang="en-US" dirty="0"/>
+              <a:t> where you don’t need a lot of additional features.</a:t>
+            </a:r>
+          </a:p>
+          <a:p>
+            <a:pPr>
+              <a:buNone/>
+            </a:pPr>
+            <a:r>
+              <a:rPr lang="en-US" dirty="0"/>
+              <a:t>🔹 But here’s the catch: </a:t>
+            </a:r>
+            <a:r>
+              <a:rPr lang="en-US" b="1" dirty="0" err="1"/>
+              <a:t>BeanFactory</a:t>
+            </a:r>
+            <a:r>
+              <a:rPr lang="en-US" b="1" dirty="0"/>
+              <a:t> does not support</a:t>
+            </a:r>
+            <a:r>
+              <a:rPr lang="en-US" dirty="0"/>
+              <a:t>:</a:t>
+            </a:r>
+          </a:p>
+          <a:p>
+            <a:pPr>
+              <a:buFont typeface="Arial" panose="020B0604020202020204" pitchFamily="34" charset="0"/>
+              <a:buChar char="•"/>
+            </a:pPr>
+            <a:r>
+              <a:rPr lang="en-US" dirty="0"/>
+              <a:t>Event handling</a:t>
+            </a:r>
+          </a:p>
+          <a:p>
+            <a:pPr>
+              <a:buFont typeface="Arial" panose="020B0604020202020204" pitchFamily="34" charset="0"/>
+              <a:buChar char="•"/>
+            </a:pPr>
+            <a:r>
+              <a:rPr lang="en-US" dirty="0"/>
+              <a:t>Annotation-based configurations</a:t>
+            </a:r>
+          </a:p>
+          <a:p>
+            <a:pPr>
+              <a:buFont typeface="Arial" panose="020B0604020202020204" pitchFamily="34" charset="0"/>
+              <a:buChar char="•"/>
+            </a:pPr>
+            <a:r>
+              <a:rPr lang="en-US" dirty="0"/>
+              <a:t>Internationalization</a:t>
+            </a:r>
+          </a:p>
+          <a:p>
+            <a:pPr>
+              <a:buFont typeface="Arial" panose="020B0604020202020204" pitchFamily="34" charset="0"/>
+              <a:buChar char="•"/>
+            </a:pPr>
+            <a:r>
+              <a:rPr lang="en-US" dirty="0"/>
+              <a:t>AOP (Aspect-Oriented Programming)</a:t>
+            </a:r>
+          </a:p>
+          <a:p>
+            <a:pPr>
+              <a:buNone/>
+            </a:pPr>
+            <a:r>
+              <a:rPr lang="en-US" dirty="0"/>
+              <a:t>If your project is simple and you don’t need these features, </a:t>
+            </a:r>
+            <a:r>
+              <a:rPr lang="en-US" dirty="0" err="1"/>
+              <a:t>BeanFactory</a:t>
+            </a:r>
+            <a:r>
+              <a:rPr lang="en-US" dirty="0"/>
+              <a:t> can be a </a:t>
+            </a:r>
+            <a:r>
+              <a:rPr lang="en-US" b="1" dirty="0"/>
+              <a:t>better choice</a:t>
+            </a:r>
+            <a:r>
+              <a:rPr lang="en-US" dirty="0"/>
+              <a:t> due to its </a:t>
+            </a:r>
+            <a:r>
+              <a:rPr lang="en-US" b="1" dirty="0"/>
+              <a:t>lower memory footprint</a:t>
+            </a:r>
+            <a:r>
+              <a:rPr lang="en-US" dirty="0"/>
+              <a:t>.</a:t>
+            </a:r>
+          </a:p>
+          <a:p>
+            <a:pPr>
+              <a:buNone/>
+            </a:pPr>
+            <a:r>
+              <a:rPr lang="en-US" b="1" dirty="0" err="1"/>
+              <a:t>ApplicationContext</a:t>
+            </a:r>
+            <a:r>
+              <a:rPr lang="en-US" b="1" dirty="0"/>
+              <a:t> – The Feature-Packed Powerhouse</a:t>
+            </a:r>
+          </a:p>
+          <a:p>
+            <a:pPr>
+              <a:buNone/>
+            </a:pPr>
+            <a:r>
+              <a:rPr lang="en-US" dirty="0"/>
+              <a:t>Now, if </a:t>
+            </a:r>
+            <a:r>
+              <a:rPr lang="en-US" b="1" dirty="0" err="1"/>
+              <a:t>BeanFactory</a:t>
+            </a:r>
+            <a:r>
+              <a:rPr lang="en-US" b="1" dirty="0"/>
+              <a:t> is the basic container</a:t>
+            </a:r>
+            <a:r>
+              <a:rPr lang="en-US" dirty="0"/>
+              <a:t>, then </a:t>
+            </a:r>
+            <a:r>
+              <a:rPr lang="en-US" b="1" dirty="0" err="1"/>
+              <a:t>ApplicationContext</a:t>
+            </a:r>
+            <a:r>
+              <a:rPr lang="en-US" b="1" dirty="0"/>
+              <a:t> is the upgraded version</a:t>
+            </a:r>
+            <a:r>
+              <a:rPr lang="en-US" dirty="0"/>
+              <a:t> with </a:t>
+            </a:r>
+            <a:r>
+              <a:rPr lang="en-US" b="1" dirty="0"/>
+              <a:t>many additional features</a:t>
+            </a:r>
+            <a:r>
+              <a:rPr lang="en-US" dirty="0"/>
+              <a:t>.</a:t>
+            </a:r>
+          </a:p>
+          <a:p>
+            <a:pPr>
+              <a:buNone/>
+            </a:pPr>
+            <a:r>
+              <a:rPr lang="en-US" dirty="0"/>
+              <a:t>✔ </a:t>
+            </a:r>
+            <a:r>
+              <a:rPr lang="en-US" b="1" dirty="0"/>
+              <a:t>Eager Initialization:</a:t>
+            </a:r>
+            <a:r>
+              <a:rPr lang="en-US" dirty="0"/>
+              <a:t> Unlike </a:t>
+            </a:r>
+            <a:r>
+              <a:rPr lang="en-US" dirty="0" err="1"/>
+              <a:t>BeanFactory</a:t>
+            </a:r>
+            <a:r>
+              <a:rPr lang="en-US" dirty="0"/>
+              <a:t>, </a:t>
+            </a:r>
+            <a:r>
+              <a:rPr lang="en-US" b="1" dirty="0" err="1"/>
+              <a:t>ApplicationContext</a:t>
+            </a:r>
+            <a:r>
+              <a:rPr lang="en-US" b="1" dirty="0"/>
+              <a:t> initializes all beans at startup</a:t>
+            </a:r>
+            <a:r>
+              <a:rPr lang="en-US" dirty="0"/>
+              <a:t>. This means that by the time your application starts running, </a:t>
+            </a:r>
+            <a:r>
+              <a:rPr lang="en-US" b="1" dirty="0"/>
+              <a:t>all required beans are already loaded and ready to use</a:t>
+            </a:r>
+            <a:r>
+              <a:rPr lang="en-US" dirty="0"/>
+              <a:t>.</a:t>
+            </a:r>
+          </a:p>
+          <a:p>
+            <a:pPr>
+              <a:buNone/>
+            </a:pPr>
+            <a:r>
+              <a:rPr lang="en-US" dirty="0"/>
+              <a:t>✔ </a:t>
+            </a:r>
+            <a:r>
+              <a:rPr lang="en-US" b="1" dirty="0"/>
+              <a:t>Event Handling:</a:t>
+            </a:r>
+            <a:r>
+              <a:rPr lang="en-US" dirty="0"/>
+              <a:t> It allows </a:t>
+            </a:r>
+            <a:r>
+              <a:rPr lang="en-US" b="1" dirty="0"/>
+              <a:t>event-based communication</a:t>
+            </a:r>
+            <a:r>
+              <a:rPr lang="en-US" dirty="0"/>
+              <a:t> between different parts of the application. This is </a:t>
+            </a:r>
+            <a:r>
+              <a:rPr lang="en-US" b="1" dirty="0"/>
+              <a:t>very useful in large, modular applications</a:t>
+            </a:r>
+            <a:r>
+              <a:rPr lang="en-US" dirty="0"/>
+              <a:t>.</a:t>
+            </a:r>
+          </a:p>
+          <a:p>
+            <a:pPr>
+              <a:buNone/>
+            </a:pPr>
+            <a:r>
+              <a:rPr lang="en-US" dirty="0"/>
+              <a:t>✔ </a:t>
+            </a:r>
+            <a:r>
+              <a:rPr lang="en-US" b="1" dirty="0"/>
+              <a:t>Annotation-Based Configuration:</a:t>
+            </a:r>
+            <a:r>
+              <a:rPr lang="en-US" dirty="0"/>
+              <a:t> </a:t>
+            </a:r>
+            <a:r>
+              <a:rPr lang="en-US" dirty="0" err="1"/>
+              <a:t>ApplicationContext</a:t>
+            </a:r>
+            <a:r>
+              <a:rPr lang="en-US" dirty="0"/>
+              <a:t> supports annotations like </a:t>
+            </a:r>
+            <a:r>
+              <a:rPr lang="en-US" b="1" dirty="0"/>
+              <a:t>@Component and @Autowired</a:t>
+            </a:r>
+            <a:r>
+              <a:rPr lang="en-US" dirty="0"/>
+              <a:t>, making the code </a:t>
+            </a:r>
+            <a:r>
+              <a:rPr lang="en-US" b="1" dirty="0"/>
+              <a:t>cleaner, more readable, and less dependent on XML configurations</a:t>
+            </a:r>
+            <a:r>
+              <a:rPr lang="en-US" dirty="0"/>
+              <a:t>.</a:t>
+            </a:r>
+          </a:p>
+          <a:p>
+            <a:pPr>
+              <a:buNone/>
+            </a:pPr>
+            <a:r>
+              <a:rPr lang="en-US" dirty="0"/>
+              <a:t>✔ </a:t>
+            </a:r>
+            <a:r>
+              <a:rPr lang="en-US" b="1" dirty="0"/>
+              <a:t>Internationalization Support:</a:t>
+            </a:r>
+            <a:r>
+              <a:rPr lang="en-US" dirty="0"/>
+              <a:t> If your application needs </a:t>
+            </a:r>
+            <a:r>
+              <a:rPr lang="en-US" b="1" dirty="0"/>
+              <a:t>multiple language support</a:t>
+            </a:r>
+            <a:r>
+              <a:rPr lang="en-US" dirty="0"/>
+              <a:t>, </a:t>
+            </a:r>
+            <a:r>
+              <a:rPr lang="en-US" dirty="0" err="1"/>
+              <a:t>ApplicationContext</a:t>
+            </a:r>
+            <a:r>
+              <a:rPr lang="en-US" dirty="0"/>
+              <a:t> makes it easy to manage </a:t>
+            </a:r>
+            <a:r>
+              <a:rPr lang="en-US" b="1" dirty="0"/>
+              <a:t>localized messages</a:t>
+            </a:r>
+            <a:r>
+              <a:rPr lang="en-US" dirty="0"/>
+              <a:t>.</a:t>
+            </a:r>
+          </a:p>
+          <a:p>
+            <a:pPr>
+              <a:buNone/>
+            </a:pPr>
+            <a:r>
+              <a:rPr lang="en-US" dirty="0"/>
+              <a:t>✔ </a:t>
+            </a:r>
+            <a:r>
+              <a:rPr lang="en-US" b="1" dirty="0"/>
+              <a:t>AOP Integration:</a:t>
+            </a:r>
+            <a:r>
+              <a:rPr lang="en-US" dirty="0"/>
+              <a:t> </a:t>
+            </a:r>
+            <a:r>
+              <a:rPr lang="en-US" dirty="0" err="1"/>
+              <a:t>ApplicationContext</a:t>
+            </a:r>
+            <a:r>
+              <a:rPr lang="en-US" dirty="0"/>
+              <a:t> supports </a:t>
+            </a:r>
+            <a:r>
+              <a:rPr lang="en-US" b="1" dirty="0"/>
+              <a:t>Aspect-Oriented Programming (AOP)</a:t>
+            </a:r>
+            <a:r>
+              <a:rPr lang="en-US" dirty="0"/>
+              <a:t>, which helps in </a:t>
+            </a:r>
+            <a:r>
+              <a:rPr lang="en-US" b="1" dirty="0"/>
+              <a:t>cross-cutting concerns like logging, security, and transactions</a:t>
+            </a:r>
+            <a:r>
+              <a:rPr lang="en-US" dirty="0"/>
+              <a:t>.</a:t>
+            </a:r>
+          </a:p>
+          <a:p>
+            <a:pPr>
+              <a:buNone/>
+            </a:pPr>
+            <a:r>
+              <a:rPr lang="en-US" dirty="0"/>
+              <a:t>Due to these advantages, </a:t>
+            </a:r>
+            <a:r>
+              <a:rPr lang="en-US" b="1" dirty="0" err="1"/>
+              <a:t>ApplicationContext</a:t>
+            </a:r>
+            <a:r>
+              <a:rPr lang="en-US" b="1" dirty="0"/>
+              <a:t> is the preferred choice for large-scale applications</a:t>
+            </a:r>
+            <a:r>
+              <a:rPr lang="en-US" dirty="0"/>
+              <a:t>, especially </a:t>
+            </a:r>
+            <a:r>
+              <a:rPr lang="en-US" b="1" dirty="0"/>
+              <a:t>enterprise-level projects</a:t>
+            </a:r>
+            <a:r>
+              <a:rPr lang="en-US" dirty="0"/>
+              <a:t> where these extra features matter.</a:t>
+            </a:r>
+          </a:p>
+          <a:p>
+            <a:pPr>
+              <a:buNone/>
+            </a:pPr>
+            <a:r>
+              <a:rPr lang="en-US" b="1" dirty="0"/>
+              <a:t>Why Does Annotation Support Matter?</a:t>
+            </a:r>
+          </a:p>
+          <a:p>
+            <a:pPr>
+              <a:buNone/>
+            </a:pPr>
+            <a:r>
+              <a:rPr lang="en-US" dirty="0"/>
+              <a:t>One of the best features of </a:t>
+            </a:r>
+            <a:r>
+              <a:rPr lang="en-US" dirty="0" err="1"/>
+              <a:t>ApplicationContext</a:t>
+            </a:r>
+            <a:r>
+              <a:rPr lang="en-US" dirty="0"/>
+              <a:t> is </a:t>
+            </a:r>
+            <a:r>
+              <a:rPr lang="en-US" b="1" dirty="0"/>
+              <a:t>annotation-based configuration</a:t>
+            </a:r>
+            <a:r>
+              <a:rPr lang="en-US" dirty="0"/>
+              <a:t>.</a:t>
+            </a:r>
+          </a:p>
+          <a:p>
+            <a:pPr>
+              <a:buNone/>
+            </a:pPr>
+            <a:r>
+              <a:rPr lang="en-US" dirty="0"/>
+              <a:t>📌 In older versions of Spring, developers had to </a:t>
+            </a:r>
+            <a:r>
+              <a:rPr lang="en-US" b="1" dirty="0"/>
+              <a:t>define beans manually in XML files</a:t>
+            </a:r>
+            <a:r>
+              <a:rPr lang="en-US" dirty="0"/>
+              <a:t>. This could get </a:t>
+            </a:r>
+            <a:r>
+              <a:rPr lang="en-US" b="1" dirty="0"/>
+              <a:t>long and messy</a:t>
+            </a:r>
+            <a:r>
+              <a:rPr lang="en-US" dirty="0"/>
+              <a:t>.</a:t>
+            </a:r>
+          </a:p>
+          <a:p>
+            <a:pPr>
+              <a:buNone/>
+            </a:pPr>
+            <a:r>
+              <a:rPr lang="en-US" dirty="0"/>
+              <a:t>📌 With </a:t>
+            </a:r>
+            <a:r>
+              <a:rPr lang="en-US" b="1" dirty="0"/>
+              <a:t>annotations like @Component and @Autowired</a:t>
+            </a:r>
+            <a:r>
+              <a:rPr lang="en-US" dirty="0"/>
+              <a:t>, Spring can </a:t>
+            </a:r>
+            <a:r>
+              <a:rPr lang="en-US" b="1" dirty="0"/>
+              <a:t>automatically detect and manage beans</a:t>
+            </a:r>
+            <a:r>
+              <a:rPr lang="en-US" dirty="0"/>
+              <a:t> without requiring XML configuration.</a:t>
+            </a:r>
+          </a:p>
+          <a:p>
+            <a:pPr>
+              <a:buNone/>
+            </a:pPr>
+            <a:r>
+              <a:rPr lang="en-US" dirty="0"/>
+              <a:t>✔ </a:t>
+            </a:r>
+            <a:r>
+              <a:rPr lang="en-US" b="1" dirty="0"/>
+              <a:t>@Component</a:t>
+            </a:r>
+            <a:r>
+              <a:rPr lang="en-US" dirty="0"/>
+              <a:t> – Marks a class as a Spring-managed bean.</a:t>
+            </a:r>
+            <a:br>
+              <a:rPr lang="en-US" dirty="0"/>
+            </a:br>
+            <a:r>
+              <a:rPr lang="en-US" dirty="0"/>
+              <a:t>✔ </a:t>
+            </a:r>
+            <a:r>
+              <a:rPr lang="en-US" b="1" dirty="0"/>
+              <a:t>@Autowired</a:t>
+            </a:r>
+            <a:r>
+              <a:rPr lang="en-US" dirty="0"/>
+              <a:t> – Automatically injects dependencies without manual bean retrieval.</a:t>
+            </a:r>
+          </a:p>
+          <a:p>
+            <a:pPr>
+              <a:buNone/>
+            </a:pPr>
+            <a:r>
+              <a:rPr lang="en-US" dirty="0"/>
+              <a:t>This makes code </a:t>
+            </a:r>
+            <a:r>
+              <a:rPr lang="en-US" b="1" dirty="0"/>
+              <a:t>cleaner, reduces boilerplate code, and improves maintainability</a:t>
+            </a:r>
+            <a:r>
+              <a:rPr lang="en-US" dirty="0"/>
+              <a:t>.</a:t>
+            </a:r>
+          </a:p>
+          <a:p>
+            <a:pPr>
+              <a:buNone/>
+            </a:pPr>
+            <a:r>
+              <a:rPr lang="en-US" b="1" dirty="0" err="1"/>
+              <a:t>BeanFactory</a:t>
+            </a:r>
+            <a:r>
+              <a:rPr lang="en-US" b="1" dirty="0"/>
+              <a:t> vs </a:t>
+            </a:r>
+            <a:r>
+              <a:rPr lang="en-US" b="1" dirty="0" err="1"/>
+              <a:t>ApplicationContext</a:t>
+            </a:r>
+            <a:r>
+              <a:rPr lang="en-US" b="1" dirty="0"/>
+              <a:t> – Quick Comparison</a:t>
+            </a:r>
+          </a:p>
+          <a:p>
+            <a:pPr>
+              <a:buNone/>
+            </a:pPr>
+            <a:r>
+              <a:rPr lang="en-US" dirty="0"/>
+              <a:t>FeatureBeanFactoryApplicationContext</a:t>
+            </a:r>
+            <a:r>
+              <a:rPr lang="en-US" b="1" dirty="0"/>
+              <a:t>Initialization</a:t>
+            </a:r>
+            <a:r>
+              <a:rPr lang="en-US" dirty="0"/>
+              <a:t>LazyEager</a:t>
+            </a:r>
+            <a:r>
+              <a:rPr lang="en-US" b="1" dirty="0"/>
+              <a:t>Memory </a:t>
+            </a:r>
+            <a:r>
+              <a:rPr lang="en-US" b="1" dirty="0" err="1"/>
+              <a:t>Efficiency</a:t>
+            </a:r>
+            <a:r>
+              <a:rPr lang="en-US" dirty="0" err="1"/>
+              <a:t>HigherLower</a:t>
+            </a:r>
+            <a:r>
+              <a:rPr lang="en-US" b="1" dirty="0" err="1"/>
+              <a:t>Event</a:t>
+            </a:r>
+            <a:r>
+              <a:rPr lang="en-US" b="1" dirty="0"/>
+              <a:t> Handling</a:t>
+            </a:r>
+            <a:r>
+              <a:rPr lang="en-US" dirty="0"/>
+              <a:t>❌ No✅ </a:t>
+            </a:r>
+            <a:r>
+              <a:rPr lang="en-US" dirty="0" err="1"/>
+              <a:t>Yes</a:t>
+            </a:r>
+            <a:r>
+              <a:rPr lang="en-US" b="1" dirty="0" err="1"/>
+              <a:t>Annotation</a:t>
+            </a:r>
+            <a:r>
+              <a:rPr lang="en-US" b="1" dirty="0"/>
+              <a:t> Support</a:t>
+            </a:r>
+            <a:r>
+              <a:rPr lang="en-US" dirty="0"/>
+              <a:t>❌ No✅ </a:t>
+            </a:r>
+            <a:r>
+              <a:rPr lang="en-US" dirty="0" err="1"/>
+              <a:t>Yes</a:t>
+            </a:r>
+            <a:r>
+              <a:rPr lang="en-US" b="1" dirty="0" err="1"/>
+              <a:t>Best</a:t>
+            </a:r>
+            <a:r>
+              <a:rPr lang="en-US" b="1" dirty="0"/>
+              <a:t> </a:t>
+            </a:r>
+            <a:r>
+              <a:rPr lang="en-US" b="1" dirty="0" err="1"/>
+              <a:t>For</a:t>
+            </a:r>
+            <a:r>
+              <a:rPr lang="en-US" dirty="0" err="1"/>
+              <a:t>Small</a:t>
+            </a:r>
+            <a:r>
+              <a:rPr lang="en-US" dirty="0"/>
+              <a:t>, lightweight </a:t>
+            </a:r>
+            <a:r>
+              <a:rPr lang="en-US" dirty="0" err="1"/>
+              <a:t>appsLarge</a:t>
+            </a:r>
+            <a:r>
+              <a:rPr lang="en-US" dirty="0"/>
+              <a:t>, enterprise apps</a:t>
+            </a:r>
+          </a:p>
+          <a:p>
+            <a:pPr>
+              <a:buNone/>
+            </a:pPr>
+            <a:r>
+              <a:rPr lang="en-US" b="1" dirty="0"/>
+              <a:t>So, Which One Should You Use?</a:t>
+            </a:r>
+          </a:p>
+          <a:p>
+            <a:pPr>
+              <a:buNone/>
+            </a:pPr>
+            <a:r>
+              <a:rPr lang="en-US" dirty="0"/>
+              <a:t>🔹 </a:t>
+            </a:r>
+            <a:r>
+              <a:rPr lang="en-US" b="1" dirty="0"/>
+              <a:t>Use </a:t>
+            </a:r>
+            <a:r>
+              <a:rPr lang="en-US" b="1" dirty="0" err="1"/>
+              <a:t>BeanFactory</a:t>
+            </a:r>
+            <a:r>
+              <a:rPr lang="en-US" b="1" dirty="0"/>
+              <a:t> if</a:t>
+            </a:r>
+            <a:r>
+              <a:rPr lang="en-US" dirty="0"/>
+              <a:t>:</a:t>
+            </a:r>
+          </a:p>
+          <a:p>
+            <a:pPr>
+              <a:buFont typeface="Arial" panose="020B0604020202020204" pitchFamily="34" charset="0"/>
+              <a:buChar char="•"/>
+            </a:pPr>
+            <a:r>
+              <a:rPr lang="en-US" dirty="0"/>
+              <a:t>You need a </a:t>
+            </a:r>
+            <a:r>
+              <a:rPr lang="en-US" b="1" dirty="0"/>
+              <a:t>lightweight</a:t>
+            </a:r>
+            <a:r>
+              <a:rPr lang="en-US" dirty="0"/>
+              <a:t> container.</a:t>
+            </a:r>
+          </a:p>
+          <a:p>
+            <a:pPr>
+              <a:buFont typeface="Arial" panose="020B0604020202020204" pitchFamily="34" charset="0"/>
+              <a:buChar char="•"/>
+            </a:pPr>
+            <a:r>
+              <a:rPr lang="en-US" dirty="0"/>
+              <a:t>You </a:t>
+            </a:r>
+            <a:r>
+              <a:rPr lang="en-US" b="1" dirty="0"/>
+              <a:t>don’t need advanced features</a:t>
+            </a:r>
+            <a:r>
+              <a:rPr lang="en-US" dirty="0"/>
+              <a:t> like event handling and annotations.</a:t>
+            </a:r>
+          </a:p>
+          <a:p>
+            <a:pPr>
+              <a:buFont typeface="Arial" panose="020B0604020202020204" pitchFamily="34" charset="0"/>
+              <a:buChar char="•"/>
+            </a:pPr>
+            <a:r>
+              <a:rPr lang="en-US" dirty="0"/>
+              <a:t>You want </a:t>
+            </a:r>
+            <a:r>
+              <a:rPr lang="en-US" b="1" dirty="0"/>
+              <a:t>lazy initialization</a:t>
+            </a:r>
+            <a:r>
+              <a:rPr lang="en-US" dirty="0"/>
+              <a:t> to save memory.</a:t>
+            </a:r>
+          </a:p>
+          <a:p>
+            <a:pPr>
+              <a:buNone/>
+            </a:pPr>
+            <a:r>
+              <a:rPr lang="en-US" dirty="0"/>
+              <a:t>🔹 </a:t>
+            </a:r>
+            <a:r>
+              <a:rPr lang="en-US" b="1" dirty="0"/>
+              <a:t>Use </a:t>
+            </a:r>
+            <a:r>
+              <a:rPr lang="en-US" b="1" dirty="0" err="1"/>
+              <a:t>ApplicationContext</a:t>
+            </a:r>
+            <a:r>
+              <a:rPr lang="en-US" b="1" dirty="0"/>
+              <a:t> if</a:t>
+            </a:r>
+            <a:r>
+              <a:rPr lang="en-US" dirty="0"/>
+              <a:t>:</a:t>
+            </a:r>
+          </a:p>
+          <a:p>
+            <a:pPr>
+              <a:buFont typeface="Arial" panose="020B0604020202020204" pitchFamily="34" charset="0"/>
+              <a:buChar char="•"/>
+            </a:pPr>
+            <a:r>
+              <a:rPr lang="en-US" dirty="0"/>
+              <a:t>You’re working on an </a:t>
+            </a:r>
+            <a:r>
+              <a:rPr lang="en-US" b="1" dirty="0"/>
+              <a:t>enterprise application</a:t>
+            </a:r>
+            <a:r>
+              <a:rPr lang="en-US" dirty="0"/>
+              <a:t>.</a:t>
+            </a:r>
+          </a:p>
+          <a:p>
+            <a:pPr>
+              <a:buFont typeface="Arial" panose="020B0604020202020204" pitchFamily="34" charset="0"/>
+              <a:buChar char="•"/>
+            </a:pPr>
+            <a:r>
+              <a:rPr lang="en-US" dirty="0"/>
+              <a:t>You need </a:t>
+            </a:r>
+            <a:r>
+              <a:rPr lang="en-US" b="1" dirty="0"/>
+              <a:t>event handling, internationalization, and AOP support</a:t>
+            </a:r>
+            <a:r>
+              <a:rPr lang="en-US" dirty="0"/>
+              <a:t>.</a:t>
+            </a:r>
+          </a:p>
+          <a:p>
+            <a:pPr>
+              <a:buFont typeface="Arial" panose="020B0604020202020204" pitchFamily="34" charset="0"/>
+              <a:buChar char="•"/>
+            </a:pPr>
+            <a:r>
+              <a:rPr lang="en-US" dirty="0"/>
+              <a:t>You prefer </a:t>
+            </a:r>
+            <a:r>
+              <a:rPr lang="en-US" b="1" dirty="0"/>
+              <a:t>annotation-based configuration</a:t>
+            </a:r>
+            <a:r>
+              <a:rPr lang="en-US" dirty="0"/>
+              <a:t> instead of XML.</a:t>
+            </a:r>
+          </a:p>
+          <a:p>
+            <a:pPr>
+              <a:buNone/>
+            </a:pPr>
+            <a:r>
+              <a:rPr lang="en-US" dirty="0"/>
+              <a:t>And that’s it! Hope this clears up the difference between </a:t>
+            </a:r>
+            <a:r>
+              <a:rPr lang="en-US" b="1" dirty="0" err="1"/>
+              <a:t>BeanFactory</a:t>
+            </a:r>
+            <a:r>
+              <a:rPr lang="en-US" b="1" dirty="0"/>
+              <a:t> and </a:t>
+            </a:r>
+            <a:r>
+              <a:rPr lang="en-US" b="1" dirty="0" err="1"/>
+              <a:t>ApplicationContext</a:t>
+            </a:r>
+            <a:r>
+              <a:rPr lang="en-US" dirty="0"/>
+              <a:t>. Which one do you prefer? Let me know in the comments! 🚀</a:t>
+            </a:r>
+          </a:p>
+          <a:p>
+            <a:r>
+              <a:rPr lang="en-US" dirty="0"/>
+              <a:t>This version adds </a:t>
+            </a:r>
+            <a:r>
+              <a:rPr lang="en-US" b="1" dirty="0"/>
+              <a:t>more explanations, practical insights, and deeper comparisons</a:t>
+            </a:r>
+            <a:r>
+              <a:rPr lang="en-US" dirty="0"/>
+              <a:t>, making it more informative while keeping it </a:t>
+            </a:r>
+            <a:r>
+              <a:rPr lang="en-US" b="1" dirty="0"/>
+              <a:t>conversational and engaging</a:t>
+            </a:r>
+            <a:r>
+              <a:rPr lang="en-US" dirty="0"/>
+              <a:t>. Let me know if you need any refinements!</a:t>
+            </a:r>
+          </a:p>
+          <a:p>
+            <a:endParaRPr lang="en-US" dirty="0"/>
+          </a:p>
+        </p:txBody>
+      </p:sp>
+      <p:sp>
+        <p:nvSpPr>
+          <p:cNvPr id="4" name="Slide Number Placeholder 3"/>
+          <p:cNvSpPr>
+            <a:spLocks noGrp="1"/>
+          </p:cNvSpPr>
+          <p:nvPr>
+            <p:ph type="sldNum" sz="quarter" idx="5"/>
+          </p:nvPr>
+        </p:nvSpPr>
+        <p:spPr/>
+        <p:txBody>
+          <a:bodyPr/>
+          <a:lstStyle/>
+          <a:p>
+            <a:fld id="{C44636D5-5DF6-479B-9D65-40E69E819BF9}" type="slidenum">
+              <a:rPr lang="en-US" smtClean="0"/>
+              <a:t>1</a:t>
+            </a:fld>
+            <a:endParaRPr lang="en-US"/>
+          </a:p>
+        </p:txBody>
+      </p:sp>
+    </p:spTree>
+    <p:extLst>
+      <p:ext uri="{BB962C8B-B14F-4D97-AF65-F5344CB8AC3E}">
+        <p14:creationId xmlns:p14="http://schemas.microsoft.com/office/powerpoint/2010/main" val="745448560"/>
+      </p:ext>
+    </p:extLst>
+  </p:cSld>
+  <p:clrMapOvr>
+    <a:masterClrMapping/>
+  </p:clrMapOvr>
+</p:notes>
+</file>
+
+<file path=ppt/notesSlides/notesSlide2.xml><?xml version="1.0" encoding="utf-8"?>
+<p:notes xmlns:a="http://schemas.openxmlformats.org/drawingml/2006/main" xmlns:r="http://schemas.openxmlformats.org/officeDocument/2006/relationships" xmlns:p="http://schemas.openxmlformats.org/presentationml/2006/main">
+  <p:cSld>
+    <p:spTree>
+      <p:nvGrpSpPr>
+        <p:cNvPr id="1" name=""/>
+        <p:cNvGrpSpPr/>
+        <p:nvPr/>
+      </p:nvGrpSpPr>
+      <p:grpSpPr>
+        <a:xfrm>
+          <a:off x="0" y="0"/>
+          <a:ext cx="0" cy="0"/>
+          <a:chOff x="0" y="0"/>
+          <a:chExt cx="0" cy="0"/>
+        </a:xfrm>
+      </p:grpSpPr>
+      <p:sp>
+        <p:nvSpPr>
+          <p:cNvPr id="2" name="Slide Image Placeholder 1"/>
+          <p:cNvSpPr>
+            <a:spLocks noGrp="1" noRot="1" noChangeAspect="1"/>
+          </p:cNvSpPr>
+          <p:nvPr>
+            <p:ph type="sldImg"/>
+          </p:nvPr>
+        </p:nvSpPr>
+        <p:spPr/>
+      </p:sp>
+      <p:sp>
+        <p:nvSpPr>
+          <p:cNvPr id="3" name="Notes Placeholder 2"/>
+          <p:cNvSpPr>
+            <a:spLocks noGrp="1"/>
+          </p:cNvSpPr>
+          <p:nvPr>
+            <p:ph type="body" idx="1"/>
+          </p:nvPr>
+        </p:nvSpPr>
+        <p:spPr/>
+        <p:txBody>
+          <a:bodyPr/>
+          <a:lstStyle/>
+          <a:p>
+            <a:pPr>
+              <a:buNone/>
+            </a:pPr>
+            <a:r>
+              <a:rPr lang="en-US" dirty="0"/>
+              <a:t>🚀 Spring Framework: </a:t>
+            </a:r>
+            <a:r>
+              <a:rPr lang="en-US" b="1" dirty="0" err="1"/>
+              <a:t>BeanFactory</a:t>
+            </a:r>
+            <a:r>
+              <a:rPr lang="en-US" b="1" dirty="0"/>
+              <a:t> vs </a:t>
+            </a:r>
+            <a:r>
+              <a:rPr lang="en-US" b="1" dirty="0" err="1"/>
+              <a:t>ApplicationContext</a:t>
+            </a:r>
+            <a:r>
+              <a:rPr lang="en-US" dirty="0"/>
+              <a:t> | Which One to Use? (+ SQL Connection Pooling)</a:t>
+            </a:r>
+          </a:p>
+          <a:p>
+            <a:pPr>
+              <a:buNone/>
+            </a:pPr>
+            <a:r>
+              <a:rPr lang="en-US" b="1" dirty="0"/>
+              <a:t>YouTube Description:</a:t>
+            </a:r>
+          </a:p>
+          <a:p>
+            <a:pPr>
+              <a:buNone/>
+            </a:pPr>
+            <a:r>
+              <a:rPr lang="en-US" dirty="0"/>
+              <a:t>🤔 </a:t>
+            </a:r>
+            <a:r>
+              <a:rPr lang="en-US" b="1" dirty="0" err="1"/>
+              <a:t>BeanFactory</a:t>
+            </a:r>
+            <a:r>
+              <a:rPr lang="en-US" b="1" dirty="0"/>
+              <a:t> vs </a:t>
+            </a:r>
+            <a:r>
+              <a:rPr lang="en-US" b="1" dirty="0" err="1"/>
+              <a:t>ApplicationContext</a:t>
+            </a:r>
+            <a:r>
+              <a:rPr lang="en-US" dirty="0"/>
+              <a:t> – Which Spring Container is Right for You? In this video, we break down the key differences between </a:t>
+            </a:r>
+            <a:r>
+              <a:rPr lang="en-US" b="1" dirty="0" err="1"/>
+              <a:t>BeanFactory</a:t>
+            </a:r>
+            <a:r>
+              <a:rPr lang="en-US" dirty="0"/>
+              <a:t> and </a:t>
+            </a:r>
+            <a:r>
+              <a:rPr lang="en-US" b="1" dirty="0" err="1"/>
+              <a:t>ApplicationContext</a:t>
+            </a:r>
+            <a:r>
+              <a:rPr lang="en-US" dirty="0"/>
+              <a:t> with an easy-to-understand </a:t>
+            </a:r>
+            <a:r>
+              <a:rPr lang="en-US" b="1" dirty="0"/>
+              <a:t>coffee shop analogy</a:t>
+            </a:r>
+            <a:r>
+              <a:rPr lang="en-US" dirty="0"/>
+              <a:t>! ☕</a:t>
+            </a:r>
+          </a:p>
+          <a:p>
+            <a:pPr>
+              <a:buNone/>
+            </a:pPr>
+            <a:r>
+              <a:rPr lang="en-US" dirty="0"/>
+              <a:t>🔹 </a:t>
+            </a:r>
+            <a:r>
+              <a:rPr lang="en-US" b="1" dirty="0"/>
+              <a:t>Topics Covered:</a:t>
+            </a:r>
+            <a:br>
+              <a:rPr lang="en-US" dirty="0"/>
+            </a:br>
+            <a:r>
+              <a:rPr lang="en-US" dirty="0"/>
+              <a:t>✅ What is </a:t>
+            </a:r>
+            <a:r>
+              <a:rPr lang="en-US" dirty="0" err="1"/>
+              <a:t>BeanFactory</a:t>
+            </a:r>
+            <a:r>
+              <a:rPr lang="en-US" dirty="0"/>
+              <a:t>? (Lazy Initialization &amp; Memory Efficiency)</a:t>
+            </a:r>
+            <a:br>
+              <a:rPr lang="en-US" dirty="0"/>
+            </a:br>
+            <a:r>
+              <a:rPr lang="en-US" dirty="0"/>
+              <a:t>✅ What is </a:t>
+            </a:r>
+            <a:r>
+              <a:rPr lang="en-US" dirty="0" err="1"/>
+              <a:t>ApplicationContext</a:t>
+            </a:r>
+            <a:r>
+              <a:rPr lang="en-US" dirty="0"/>
+              <a:t>? (Eager Initialization &amp; Advanced Features)</a:t>
+            </a:r>
+            <a:br>
+              <a:rPr lang="en-US" dirty="0"/>
+            </a:br>
+            <a:r>
+              <a:rPr lang="en-US" dirty="0"/>
+              <a:t>✅ Which One is Better for Large-Scale Applications?</a:t>
+            </a:r>
+            <a:br>
+              <a:rPr lang="en-US" dirty="0"/>
+            </a:br>
+            <a:r>
+              <a:rPr lang="en-US" dirty="0"/>
+              <a:t>✅ </a:t>
+            </a:r>
+            <a:r>
+              <a:rPr lang="en-US" b="1" dirty="0"/>
+              <a:t>Bonus:</a:t>
+            </a:r>
+            <a:r>
+              <a:rPr lang="en-US" dirty="0"/>
+              <a:t> How Spring Manages SQL Connection Pooling for Efficient Database Performance</a:t>
+            </a:r>
+          </a:p>
+          <a:p>
+            <a:pPr>
+              <a:buNone/>
+            </a:pPr>
+            <a:r>
+              <a:rPr lang="en-US" dirty="0"/>
+              <a:t>🔔 </a:t>
+            </a:r>
+            <a:r>
+              <a:rPr lang="en-US" b="1" dirty="0"/>
+              <a:t>Subscribe for more Spring Framework and SQL tutorials!</a:t>
+            </a:r>
+            <a:r>
+              <a:rPr lang="en-US" dirty="0"/>
+              <a:t> Don't forget to </a:t>
+            </a:r>
+            <a:r>
+              <a:rPr lang="en-US" b="1" dirty="0"/>
+              <a:t>like, comment, and share!</a:t>
+            </a:r>
+            <a:endParaRPr lang="en-US" dirty="0"/>
+          </a:p>
+          <a:p>
+            <a:r>
+              <a:rPr lang="en-US" dirty="0"/>
+              <a:t>#SpringBoot #Java #SpringFramework #BeanFactory #ApplicationContext #SQL #Database #JavaDevelopment #SpringCore</a:t>
+            </a:r>
+          </a:p>
+          <a:p>
+            <a:endParaRPr lang="en-US" dirty="0"/>
+          </a:p>
+        </p:txBody>
+      </p:sp>
+      <p:sp>
+        <p:nvSpPr>
+          <p:cNvPr id="4" name="Slide Number Placeholder 3"/>
+          <p:cNvSpPr>
+            <a:spLocks noGrp="1"/>
+          </p:cNvSpPr>
+          <p:nvPr>
+            <p:ph type="sldNum" sz="quarter" idx="5"/>
+          </p:nvPr>
+        </p:nvSpPr>
+        <p:spPr/>
+        <p:txBody>
+          <a:bodyPr/>
+          <a:lstStyle/>
+          <a:p>
+            <a:fld id="{C44636D5-5DF6-479B-9D65-40E69E819BF9}" type="slidenum">
+              <a:rPr lang="en-US" smtClean="0"/>
+              <a:t>2</a:t>
+            </a:fld>
+            <a:endParaRPr lang="en-US"/>
+          </a:p>
+        </p:txBody>
+      </p:sp>
+    </p:spTree>
+    <p:extLst>
+      <p:ext uri="{BB962C8B-B14F-4D97-AF65-F5344CB8AC3E}">
+        <p14:creationId xmlns:p14="http://schemas.microsoft.com/office/powerpoint/2010/main" val="100233522"/>
+      </p:ext>
+    </p:extLst>
+  </p:cSld>
+  <p:clrMapOvr>
+    <a:masterClrMapping/>
+  </p:clrMapOvr>
+</p:notes>
 </file>
 
 <file path=ppt/slideLayouts/slideLayout1.xml><?xml version="1.0" encoding="utf-8"?>
@@ -5911,7 +7691,20 @@
           <a:lstStyle/>
           <a:p>
             <a:r>
-              <a:t>BeanFactory vs ApplicationContext - Overview</a:t>
+              <a:rPr sz="3600" dirty="0" err="1"/>
+              <a:t>BeanFactory</a:t>
+            </a:r>
+            <a:r>
+              <a:rPr sz="3600" dirty="0"/>
+              <a:t> vs </a:t>
+            </a:r>
+            <a:r>
+              <a:rPr sz="3600" dirty="0" err="1"/>
+              <a:t>ApplicationContext</a:t>
+            </a:r>
+            <a:r>
+              <a:rPr sz="3600" dirty="0"/>
+              <a:t> - Overview</a:t>
             </a:r>
           </a:p>
         </p:txBody>
@@ -5928,12 +7721,16 @@
         </p:nvSpPr>
         <p:spPr/>
         <p:txBody>
-          <a:bodyPr/>
+          <a:bodyPr>
+            <a:normAutofit/>
+          </a:bodyPr>
           <a:lstStyle/>
           <a:p>
             <a:r>
-              <a:t>Auto-generated Presentation</a:t>
-            </a:r>
+              <a:rPr lang="en-US" sz="3200" dirty="0"/>
+              <a:t>Spring Framework</a:t>
+            </a:r>
+            <a:endParaRPr sz="3200" dirty="0"/>
           </a:p>
         </p:txBody>
       </p:sp>
@@ -8263,4 +10060,319 @@
     </a:ext>
   </a:extLst>
 </a:theme>
+</file>
+
+<file path=ppt/theme/theme2.xml><?xml version="1.0" encoding="utf-8"?>
+<a:theme xmlns:a="http://schemas.openxmlformats.org/drawingml/2006/main" name="Office Theme">
+  <a:themeElements>
+    <a:clrScheme name="Office">
+      <a:dk1>
+        <a:sysClr val="windowText" lastClr="000000"/>
+      </a:dk1>
+      <a:lt1>
+        <a:sysClr val="window" lastClr="FFFFFF"/>
+      </a:lt1>
+      <a:dk2>
+        <a:srgbClr val="0E2841"/>
+      </a:dk2>
+      <a:lt2>
+        <a:srgbClr val="E8E8E8"/>
+      </a:lt2>
+      <a:accent1>
+        <a:srgbClr val="156082"/>
+      </a:accent1>
+      <a:accent2>
+        <a:srgbClr val="E97132"/>
+      </a:accent2>
+      <a:accent3>
+        <a:srgbClr val="196B24"/>
+      </a:accent3>
+      <a:accent4>
+        <a:srgbClr val="0F9ED5"/>
+      </a:accent4>
+      <a:accent5>
+        <a:srgbClr val="A02B93"/>
+      </a:accent5>
+      <a:accent6>
+        <a:srgbClr val="4EA72E"/>
+      </a:accent6>
+      <a:hlink>
+        <a:srgbClr val="467886"/>
+      </a:hlink>
+      <a:folHlink>
+        <a:srgbClr val="96607D"/>
+      </a:folHlink>
+    </a:clrScheme>
+    <a:fontScheme name="Office">
+      <a:majorFont>
+        <a:latin typeface="Aptos Display" panose="02110004020202020204"/>
+        <a:ea typeface=""/>
+        <a:cs typeface=""/>
+        <a:font script="Jpan" typeface="游ゴシック Light"/>
+        <a:font script="Hang" typeface="맑은 고딕"/>
+        <a:font script="Hans" typeface="等线 Light"/>
+        <a:font script="Hant" typeface="新細明體"/>
+        <a:font script="Arab" typeface="Times New Roman"/>
+        <a:font script="Hebr" typeface="Times New Roman"/>
+        <a:font script="Thai" typeface="Angsana New"/>
+        <a:font script="Ethi" typeface="Nyala"/>
+        <a:font script="Beng" typeface="Vrinda"/>
+        <a:font script="Gujr" typeface="Shruti"/>
+        <a:font script="Khmr" typeface="MoolBoran"/>
+        <a:font script="Knda" typeface="Tunga"/>
+        <a:font script="Guru" typeface="Raavi"/>
+        <a:font script="Cans" typeface="Euphemia"/>
+        <a:font script="Cher" typeface="Plantagenet Cherokee"/>
+        <a:font script="Yiii" typeface="Microsoft Yi Baiti"/>
+        <a:font script="Tibt" typeface="Microsoft Himalaya"/>
+        <a:font script="Thaa" typeface="MV Boli"/>
+        <a:font script="Deva" typeface="Mangal"/>
+        <a:font script="Telu" typeface="Gautami"/>
+        <a:font script="Taml" typeface="Latha"/>
+        <a:font script="Syrc" typeface="Estrangelo Edessa"/>
+        <a:font script="Orya" typeface="Kalinga"/>
+        <a:font script="Mlym" typeface="Kartika"/>
+        <a:font script="Laoo" typeface="DokChampa"/>
+        <a:font script="Sinh" typeface="Iskoola Pota"/>
+        <a:font script="Mong" typeface="Mongolian Baiti"/>
+        <a:font script="Viet" typeface="Times New Roman"/>
+        <a:font script="Uigh" typeface="Microsoft Uighur"/>
+        <a:font script="Geor" typeface="Sylfaen"/>
+        <a:font script="Armn" typeface="Arial"/>
+        <a:font script="Bugi" typeface="Leelawadee UI"/>
+        <a:font script="Bopo" typeface="Microsoft JhengHei"/>
+        <a:font script="Java" typeface="Javanese Text"/>
+        <a:font script="Lisu" typeface="Segoe UI"/>
+        <a:font script="Mymr" typeface="Myanmar Text"/>
+        <a:font script="Nkoo" typeface="Ebrima"/>
+        <a:font script="Olck" typeface="Nirmala UI"/>
+        <a:font script="Osma" typeface="Ebrima"/>
+        <a:font script="Phag" typeface="Phagspa"/>
+        <a:font script="Syrn" typeface="Estrangelo Edessa"/>
+        <a:font script="Syrj" typeface="Estrangelo Edessa"/>
+        <a:font script="Syre" typeface="Estrangelo Edessa"/>
+        <a:font script="Sora" typeface="Nirmala UI"/>
+        <a:font script="Tale" typeface="Microsoft Tai Le"/>
+        <a:font script="Talu" typeface="Microsoft New Tai Lue"/>
+        <a:font script="Tfng" typeface="Ebrima"/>
+      </a:majorFont>
+      <a:minorFont>
+        <a:latin typeface="Aptos" panose="02110004020202020204"/>
+        <a:ea typeface=""/>
+        <a:cs typeface=""/>
+        <a:font script="Jpan" typeface="游ゴシック"/>
+        <a:font script="Hang" typeface="맑은 고딕"/>
+        <a:font script="Hans" typeface="等线"/>
+        <a:font script="Hant" typeface="新細明體"/>
+        <a:font script="Arab" typeface="Arial"/>
+        <a:font script="Hebr" typeface="Arial"/>
+        <a:font script="Thai" typeface="Cordia New"/>
+        <a:font script="Ethi" typeface="Nyala"/>
+        <a:font script="Beng" typeface="Vrinda"/>
+        <a:font script="Gujr" typeface="Shruti"/>
+        <a:font script="Khmr" typeface="DaunPenh"/>
+        <a:font script="Knda" typeface="Tunga"/>
+        <a:font script="Guru" typeface="Raavi"/>
+        <a:font script="Cans" typeface="Euphemia"/>
+        <a:font script="Cher" typeface="Plantagenet Cherokee"/>
+        <a:font script="Yiii" typeface="Microsoft Yi Baiti"/>
+        <a:font script="Tibt" typeface="Microsoft Himalaya"/>
+        <a:font script="Thaa" typeface="MV Boli"/>
+        <a:font script="Deva" typeface="Mangal"/>
+        <a:font script="Telu" typeface="Gautami"/>
+        <a:font script="Taml" typeface="Latha"/>
+        <a:font script="Syrc" typeface="Estrangelo Edessa"/>
+        <a:font script="Orya" typeface="Kalinga"/>
+        <a:font script="Mlym" typeface="Kartika"/>
+        <a:font script="Laoo" typeface="DokChampa"/>
+        <a:font script="Sinh" typeface="Iskoola Pota"/>
+        <a:font script="Mong" typeface="Mongolian Baiti"/>
+        <a:font script="Viet" typeface="Arial"/>
+        <a:font script="Uigh" typeface="Microsoft Uighur"/>
+        <a:font script="Geor" typeface="Sylfaen"/>
+        <a:font script="Armn" typeface="Arial"/>
+        <a:font script="Bugi" typeface="Leelawadee UI"/>
+        <a:font script="Bopo" typeface="Microsoft JhengHei"/>
+        <a:font script="Java" typeface="Javanese Text"/>
+        <a:font script="Lisu" typeface="Segoe UI"/>
+        <a:font script="Mymr" typeface="Myanmar Text"/>
+        <a:font script="Nkoo" typeface="Ebrima"/>
+        <a:font script="Olck" typeface="Nirmala UI"/>
+        <a:font script="Osma" typeface="Ebrima"/>
+        <a:font script="Phag" typeface="Phagspa"/>
+        <a:font script="Syrn" typeface="Estrangelo Edessa"/>
+        <a:font script="Syrj" typeface="Estrangelo Edessa"/>
+        <a:font script="Syre" typeface="Estrangelo Edessa"/>
+        <a:font script="Sora" typeface="Nirmala UI"/>
+        <a:font script="Tale" typeface="Microsoft Tai Le"/>
+        <a:font script="Talu" typeface="Microsoft New Tai Lue"/>
+        <a:font script="Tfng" typeface="Ebrima"/>
+      </a:minorFont>
+    </a:fontScheme>
+    <a:fmtScheme name="Office">
+      <a:fillStyleLst>
+        <a:solidFill>
+          <a:schemeClr val="phClr"/>
+        </a:solidFill>
+        <a:gradFill rotWithShape="1">
+          <a:gsLst>
+            <a:gs pos="0">
+              <a:schemeClr val="phClr">
+                <a:lumMod val="110000"/>
+                <a:satMod val="105000"/>
+                <a:tint val="67000"/>
+              </a:schemeClr>
+            </a:gs>
+            <a:gs pos="50000">
+              <a:schemeClr val="phClr">
+                <a:lumMod val="105000"/>
+                <a:satMod val="103000"/>
+                <a:tint val="73000"/>
+              </a:schemeClr>
+            </a:gs>
+            <a:gs pos="100000">
+              <a:schemeClr val="phClr">
+                <a:lumMod val="105000"/>
+                <a:satMod val="109000"/>
+                <a:tint val="81000"/>
+              </a:schemeClr>
+            </a:gs>
+          </a:gsLst>
+          <a:lin ang="5400000" scaled="0"/>
+        </a:gradFill>
+        <a:gradFill rotWithShape="1">
+          <a:gsLst>
+            <a:gs pos="0">
+              <a:schemeClr val="phClr">
+                <a:satMod val="103000"/>
+                <a:lumMod val="102000"/>
+                <a:tint val="94000"/>
+              </a:schemeClr>
+            </a:gs>
+            <a:gs pos="50000">
+              <a:schemeClr val="phClr">
+                <a:satMod val="110000"/>
+                <a:lumMod val="100000"/>
+                <a:shade val="100000"/>
+              </a:schemeClr>
+            </a:gs>
+            <a:gs pos="100000">
+              <a:schemeClr val="phClr">
+                <a:lumMod val="99000"/>
+                <a:satMod val="120000"/>
+                <a:shade val="78000"/>
+              </a:schemeClr>
+            </a:gs>
+          </a:gsLst>
+          <a:lin ang="5400000" scaled="0"/>
+        </a:gradFill>
+      </a:fillStyleLst>
+      <a:lnStyleLst>
+        <a:ln w="12700" cap="flat" cmpd="sng" algn="ctr">
+          <a:solidFill>
+            <a:schemeClr val="phClr"/>
+          </a:solidFill>
+          <a:prstDash val="solid"/>
+          <a:miter lim="800000"/>
+        </a:ln>
+        <a:ln w="19050" cap="flat" cmpd="sng" algn="ctr">
+          <a:solidFill>
+            <a:schemeClr val="phClr"/>
+          </a:solidFill>
+          <a:prstDash val="solid"/>
+          <a:miter lim="800000"/>
+        </a:ln>
+        <a:ln w="25400" cap="flat" cmpd="sng" algn="ctr">
+          <a:solidFill>
+            <a:schemeClr val="phClr"/>
+          </a:solidFill>
+          <a:prstDash val="solid"/>
+          <a:miter lim="800000"/>
+        </a:ln>
+      </a:lnStyleLst>
+      <a:effectStyleLst>
+        <a:effectStyle>
+          <a:effectLst/>
+        </a:effectStyle>
+        <a:effectStyle>
+          <a:effectLst/>
+        </a:effectStyle>
+        <a:effectStyle>
+          <a:effectLst>
+            <a:outerShdw blurRad="57150" dist="19050" dir="5400000" algn="ctr" rotWithShape="0">
+              <a:srgbClr val="000000">
+                <a:alpha val="63000"/>
+              </a:srgbClr>
+            </a:outerShdw>
+          </a:effectLst>
+        </a:effectStyle>
+      </a:effectStyleLst>
+      <a:bgFillStyleLst>
+        <a:solidFill>
+          <a:schemeClr val="phClr"/>
+        </a:solidFill>
+        <a:solidFill>
+          <a:schemeClr val="phClr">
+            <a:tint val="95000"/>
+            <a:satMod val="170000"/>
+          </a:schemeClr>
+        </a:solidFill>
+        <a:gradFill rotWithShape="1">
+          <a:gsLst>
+            <a:gs pos="0">
+              <a:schemeClr val="phClr">
+                <a:tint val="93000"/>
+                <a:satMod val="150000"/>
+                <a:shade val="98000"/>
+                <a:lumMod val="102000"/>
+              </a:schemeClr>
+            </a:gs>
+            <a:gs pos="50000">
+              <a:schemeClr val="phClr">
+                <a:tint val="98000"/>
+                <a:satMod val="130000"/>
+                <a:shade val="90000"/>
+                <a:lumMod val="103000"/>
+              </a:schemeClr>
+            </a:gs>
+            <a:gs pos="100000">
+              <a:schemeClr val="phClr">
+                <a:shade val="63000"/>
+                <a:satMod val="120000"/>
+              </a:schemeClr>
+            </a:gs>
+          </a:gsLst>
+          <a:lin ang="5400000" scaled="0"/>
+        </a:gradFill>
+      </a:bgFillStyleLst>
+    </a:fmtScheme>
+  </a:themeElements>
+  <a:objectDefaults>
+    <a:lnDef>
+      <a:spPr/>
+      <a:bodyPr/>
+      <a:lstStyle/>
+      <a:style>
+        <a:lnRef idx="2">
+          <a:schemeClr val="accent1"/>
+        </a:lnRef>
+        <a:fillRef idx="0">
+          <a:schemeClr val="accent1"/>
+        </a:fillRef>
+        <a:effectRef idx="1">
+          <a:schemeClr val="accent1"/>
+        </a:effectRef>
+        <a:fontRef idx="minor">
+          <a:schemeClr val="tx1"/>
+        </a:fontRef>
+      </a:style>
+    </a:lnDef>
+  </a:objectDefaults>
+  <a:extraClrSchemeLst/>
+  <a:extLst>
+    <a:ext uri="{05A4C25C-085E-4340-85A3-A5531E510DB2}">
+      <thm15:themeFamily xmlns:thm15="http://schemas.microsoft.com/office/thememl/2012/main" name="Office Theme" id="{2E142A2C-CD16-42D6-873A-C26D2A0506FA}" vid="{1BDDFF52-6CD6-40A5-AB3C-68EB2F1E4D0A}"/>
+    </a:ext>
+  </a:extLst>
+</a:theme>
 </file>
</xml_diff>